<commit_message>
Freelance on upwork slides
</commit_message>
<xml_diff>
--- a/Freelancing/Freelance Session 0 - Foundation.pptx
+++ b/Freelancing/Freelance Session 0 - Foundation.pptx
@@ -30325,18 +30325,6 @@
               <a:t>Foundation session  </a:t>
             </a:r>
           </a:p>
-          <a:p>
-            <a:r>
-              <a:rPr lang="en-US" dirty="0"/>
-              <a:t>An overview of basic JavaScript syntax</a:t>
-            </a:r>
-            <a:endParaRPr lang="en-US" dirty="0">
-              <a:solidFill>
-                <a:srgbClr val="D1D5DB"/>
-              </a:solidFill>
-              <a:latin typeface="Söhne"/>
-            </a:endParaRPr>
-          </a:p>
         </p:txBody>
       </p:sp>
       <p:sp>

</xml_diff>